<commit_message>
Done with the presantation
</commit_message>
<xml_diff>
--- a/Prezentacija/Dinamička verifikacija softvera - Prezentacija.pptx
+++ b/Prezentacija/Dinamička verifikacija softvera - Prezentacija.pptx
@@ -18,6 +18,7 @@
     <p:sldId id="266" r:id="rId12"/>
     <p:sldId id="267" r:id="rId13"/>
     <p:sldId id="268" r:id="rId14"/>
+    <p:sldId id="269" r:id="rId15"/>
   </p:sldIdLst>
   <p:sldSz cx="12192000" cy="6858000"/>
   <p:notesSz cx="6858000" cy="9144000"/>
@@ -134,6 +135,7 @@
             <p14:sldId id="266"/>
             <p14:sldId id="267"/>
             <p14:sldId id="268"/>
+            <p14:sldId id="269"/>
           </p14:sldIdLst>
         </p14:section>
         <p14:section name="Untitled Section" id="{377D9354-701C-45FC-ACDF-8DE4A4A172DB}">
@@ -146,6 +148,18 @@
     </p:ext>
   </p:extLst>
 </p:presentation>
+</file>
+
+<file path=ppt/commentAuthors.xml><?xml version="1.0" encoding="utf-8"?>
+<p:cmAuthorLst xmlns:a="http://schemas.openxmlformats.org/drawingml/2006/main" xmlns:r="http://schemas.openxmlformats.org/officeDocument/2006/relationships" xmlns:p="http://schemas.openxmlformats.org/presentationml/2006/main">
+  <p:cmAuthor id="1" name="Edin Pinjić" initials="EP" lastIdx="1" clrIdx="0">
+    <p:extLst>
+      <p:ext uri="{19B8F6BF-5375-455C-9EA6-DF929625EA0E}">
+        <p15:presenceInfo xmlns:p15="http://schemas.microsoft.com/office/powerpoint/2012/main" userId="3ac462183c2edbe2" providerId="Windows Live"/>
+      </p:ext>
+    </p:extLst>
+  </p:cmAuthor>
+</p:cmAuthorLst>
 </file>
 
 <file path=ppt/slideLayouts/slideLayout1.xml><?xml version="1.0" encoding="utf-8"?>
@@ -5828,7 +5842,7 @@
         </p:nvSpPr>
         <p:spPr>
           <a:xfrm>
-            <a:off x="6096000" y="2044816"/>
+            <a:off x="6096000" y="2128706"/>
             <a:ext cx="5114473" cy="2768367"/>
           </a:xfrm>
         </p:spPr>
@@ -5894,13 +5908,13 @@
   <p:clrMapOvr>
     <a:masterClrMapping/>
   </p:clrMapOvr>
-  <mc:AlternateContent xmlns:mc="http://schemas.openxmlformats.org/markup-compatibility/2006">
-    <mc:Choice xmlns:p14="http://schemas.microsoft.com/office/powerpoint/2010/main" Requires="p14">
+  <mc:AlternateContent xmlns:mc="http://schemas.openxmlformats.org/markup-compatibility/2006" xmlns:p14="http://schemas.microsoft.com/office/powerpoint/2010/main">
+    <mc:Choice Requires="p14">
       <p:transition spd="slow" p14:dur="800">
         <p14:flythrough/>
       </p:transition>
     </mc:Choice>
-    <mc:Fallback>
+    <mc:Fallback xmlns="">
       <p:transition spd="slow">
         <p:fade/>
       </p:transition>
@@ -6047,13 +6061,13 @@
   <p:clrMapOvr>
     <a:masterClrMapping/>
   </p:clrMapOvr>
-  <mc:AlternateContent xmlns:mc="http://schemas.openxmlformats.org/markup-compatibility/2006">
-    <mc:Choice xmlns:p14="http://schemas.microsoft.com/office/powerpoint/2010/main" Requires="p14">
+  <mc:AlternateContent xmlns:mc="http://schemas.openxmlformats.org/markup-compatibility/2006" xmlns:p14="http://schemas.microsoft.com/office/powerpoint/2010/main">
+    <mc:Choice Requires="p14">
       <p:transition spd="slow" p14:dur="800">
         <p14:flythrough/>
       </p:transition>
     </mc:Choice>
-    <mc:Fallback>
+    <mc:Fallback xmlns="">
       <p:transition spd="slow">
         <p:fade/>
       </p:transition>
@@ -6305,13 +6319,13 @@
   <p:clrMapOvr>
     <a:masterClrMapping/>
   </p:clrMapOvr>
-  <mc:AlternateContent xmlns:mc="http://schemas.openxmlformats.org/markup-compatibility/2006">
-    <mc:Choice xmlns:p14="http://schemas.microsoft.com/office/powerpoint/2010/main" Requires="p14">
+  <mc:AlternateContent xmlns:mc="http://schemas.openxmlformats.org/markup-compatibility/2006" xmlns:p14="http://schemas.microsoft.com/office/powerpoint/2010/main">
+    <mc:Choice Requires="p14">
       <p:transition spd="slow" p14:dur="800">
         <p14:flythrough/>
       </p:transition>
     </mc:Choice>
-    <mc:Fallback>
+    <mc:Fallback xmlns="">
       <p:transition spd="slow">
         <p:fade/>
       </p:transition>
@@ -6513,13 +6527,13 @@
   <p:clrMapOvr>
     <a:masterClrMapping/>
   </p:clrMapOvr>
-  <mc:AlternateContent xmlns:mc="http://schemas.openxmlformats.org/markup-compatibility/2006">
-    <mc:Choice xmlns:p14="http://schemas.microsoft.com/office/powerpoint/2010/main" Requires="p14">
+  <mc:AlternateContent xmlns:mc="http://schemas.openxmlformats.org/markup-compatibility/2006" xmlns:p14="http://schemas.microsoft.com/office/powerpoint/2010/main">
+    <mc:Choice Requires="p14">
       <p:transition spd="slow" p14:dur="800">
         <p14:flythrough/>
       </p:transition>
     </mc:Choice>
-    <mc:Fallback>
+    <mc:Fallback xmlns="">
       <p:transition spd="slow">
         <p:fade/>
       </p:transition>
@@ -6596,15 +6610,87 @@
             <p:ph idx="1"/>
           </p:nvPr>
         </p:nvSpPr>
-        <p:spPr/>
+        <p:spPr>
+          <a:xfrm>
+            <a:off x="786469" y="1456267"/>
+            <a:ext cx="10131425" cy="3649133"/>
+          </a:xfrm>
+        </p:spPr>
         <p:txBody>
           <a:bodyPr/>
           <a:lstStyle/>
           <a:p>
+            <a:r>
+              <a:rPr lang="bs-Latn-BA" sz="2800" dirty="0"/>
+              <a:t>Preporučuje se implementacija</a:t>
+            </a:r>
+          </a:p>
+          <a:p>
+            <a:r>
+              <a:rPr lang="bs-Latn-BA" sz="2800" dirty="0"/>
+              <a:t>Olakšava posao (debug)</a:t>
+            </a:r>
+          </a:p>
+          <a:p>
+            <a:r>
+              <a:rPr lang="bs-Latn-BA" sz="2800" dirty="0"/>
+              <a:t>Nije pretjerano komplikovano</a:t>
+            </a:r>
+          </a:p>
+          <a:p>
+            <a:r>
+              <a:rPr lang="bs-Latn-BA" sz="2800" dirty="0"/>
+              <a:t>Najbolje upotrijebiti u kombinaciji sa statičkom verifikacijom</a:t>
+            </a:r>
+          </a:p>
+          <a:p>
             <a:endParaRPr lang="bs-Latn-BA" dirty="0"/>
           </a:p>
         </p:txBody>
       </p:sp>
+      <p:pic>
+        <p:nvPicPr>
+          <p:cNvPr id="6" name="Graphic 5" descr="Head with gears">
+            <a:extLst>
+              <a:ext uri="{FF2B5EF4-FFF2-40B4-BE49-F238E27FC236}">
+                <a16:creationId xmlns:a16="http://schemas.microsoft.com/office/drawing/2014/main" id="{99E38697-D8EF-48EC-AF9D-D0D44A4C3A40}"/>
+              </a:ext>
+            </a:extLst>
+          </p:cNvPr>
+          <p:cNvPicPr>
+            <a:picLocks noChangeAspect="1"/>
+          </p:cNvPicPr>
+          <p:nvPr/>
+        </p:nvPicPr>
+        <p:blipFill>
+          <a:blip r:embed="rId2">
+            <a:extLst>
+              <a:ext uri="{96DAC541-7B7A-43D3-8B79-37D633B846F1}">
+                <asvg:svgBlip xmlns:asvg="http://schemas.microsoft.com/office/drawing/2016/SVG/main" r:embed="rId3"/>
+              </a:ext>
+            </a:extLst>
+          </a:blip>
+          <a:stretch>
+            <a:fillRect/>
+          </a:stretch>
+        </p:blipFill>
+        <p:spPr>
+          <a:xfrm flipH="1">
+            <a:off x="4815279" y="-176169"/>
+            <a:ext cx="7376719" cy="6820515"/>
+          </a:xfrm>
+          <a:prstGeom prst="rect">
+            <a:avLst/>
+          </a:prstGeom>
+          <a:effectLst>
+            <a:glow rad="228600">
+              <a:schemeClr val="tx1">
+                <a:alpha val="40000"/>
+              </a:schemeClr>
+            </a:glow>
+          </a:effectLst>
+        </p:spPr>
+      </p:pic>
     </p:spTree>
     <p:extLst>
       <p:ext uri="{BB962C8B-B14F-4D97-AF65-F5344CB8AC3E}">
@@ -6615,13 +6701,144 @@
   <p:clrMapOvr>
     <a:masterClrMapping/>
   </p:clrMapOvr>
-  <mc:AlternateContent xmlns:mc="http://schemas.openxmlformats.org/markup-compatibility/2006">
-    <mc:Choice xmlns:p14="http://schemas.microsoft.com/office/powerpoint/2010/main" Requires="p14">
+  <mc:AlternateContent xmlns:mc="http://schemas.openxmlformats.org/markup-compatibility/2006" xmlns:p14="http://schemas.microsoft.com/office/powerpoint/2010/main">
+    <mc:Choice Requires="p14">
       <p:transition spd="slow" p14:dur="800">
         <p14:flythrough/>
       </p:transition>
     </mc:Choice>
-    <mc:Fallback>
+    <mc:Fallback xmlns="">
+      <p:transition spd="slow">
+        <p:fade/>
+      </p:transition>
+    </mc:Fallback>
+  </mc:AlternateContent>
+</p:sld>
+</file>
+
+<file path=ppt/slides/slide14.xml><?xml version="1.0" encoding="utf-8"?>
+<p:sld xmlns:a="http://schemas.openxmlformats.org/drawingml/2006/main" xmlns:r="http://schemas.openxmlformats.org/officeDocument/2006/relationships" xmlns:p="http://schemas.openxmlformats.org/presentationml/2006/main">
+  <p:cSld>
+    <p:bg>
+      <p:bgPr>
+        <a:solidFill>
+          <a:schemeClr val="bg2"/>
+        </a:solidFill>
+        <a:effectLst/>
+      </p:bgPr>
+    </p:bg>
+    <p:spTree>
+      <p:nvGrpSpPr>
+        <p:cNvPr id="1" name=""/>
+        <p:cNvGrpSpPr/>
+        <p:nvPr/>
+      </p:nvGrpSpPr>
+      <p:grpSpPr>
+        <a:xfrm>
+          <a:off x="0" y="0"/>
+          <a:ext cx="0" cy="0"/>
+          <a:chOff x="0" y="0"/>
+          <a:chExt cx="0" cy="0"/>
+        </a:xfrm>
+      </p:grpSpPr>
+      <p:pic>
+        <p:nvPicPr>
+          <p:cNvPr id="32" name="Picture 6">
+            <a:extLst>
+              <a:ext uri="{FF2B5EF4-FFF2-40B4-BE49-F238E27FC236}">
+                <a16:creationId xmlns:a16="http://schemas.microsoft.com/office/drawing/2014/main" id="{18BD78ED-75E1-4879-B369-BC61F7C45E22}"/>
+              </a:ext>
+              <a:ext uri="{C183D7F6-B498-43B3-948B-1728B52AA6E4}">
+                <adec:decorative xmlns:adec="http://schemas.microsoft.com/office/drawing/2017/decorative" val="1"/>
+              </a:ext>
+            </a:extLst>
+          </p:cNvPr>
+          <p:cNvPicPr>
+            <a:picLocks noGrp="1" noRot="1" noChangeAspect="1" noMove="1" noResize="1" noEditPoints="1" noAdjustHandles="1" noChangeArrowheads="1" noChangeShapeType="1" noCrop="1"/>
+          </p:cNvPicPr>
+          <p:nvPr>
+            <p:extLst>
+              <p:ext uri="{386F3935-93C4-4BCD-93E2-E3B085C9AB24}">
+                <p16:designElem xmlns:p16="http://schemas.microsoft.com/office/powerpoint/2015/main" val="1"/>
+              </p:ext>
+            </p:extLst>
+          </p:nvPr>
+        </p:nvPicPr>
+        <p:blipFill>
+          <a:blip r:embed="rId2">
+            <a:extLst>
+              <a:ext uri="{28A0092B-C50C-407E-A947-70E740481C1C}">
+                <a14:useLocalDpi xmlns:a14="http://schemas.microsoft.com/office/drawing/2010/main" val="0"/>
+              </a:ext>
+            </a:extLst>
+          </a:blip>
+          <a:stretch>
+            <a:fillRect/>
+          </a:stretch>
+        </p:blipFill>
+        <p:spPr>
+          <a:xfrm>
+            <a:off x="0" y="0"/>
+            <a:ext cx="12188825" cy="6856214"/>
+          </a:xfrm>
+          <a:prstGeom prst="rect">
+            <a:avLst/>
+          </a:prstGeom>
+        </p:spPr>
+      </p:pic>
+      <p:sp>
+        <p:nvSpPr>
+          <p:cNvPr id="2" name="Title 1">
+            <a:extLst>
+              <a:ext uri="{FF2B5EF4-FFF2-40B4-BE49-F238E27FC236}">
+                <a16:creationId xmlns:a16="http://schemas.microsoft.com/office/drawing/2014/main" id="{20946407-0524-4FAA-A389-A6F634A2BFD5}"/>
+              </a:ext>
+            </a:extLst>
+          </p:cNvPr>
+          <p:cNvSpPr>
+            <a:spLocks noGrp="1"/>
+          </p:cNvSpPr>
+          <p:nvPr>
+            <p:ph type="title"/>
+          </p:nvPr>
+        </p:nvSpPr>
+        <p:spPr>
+          <a:xfrm>
+            <a:off x="2730758" y="1799252"/>
+            <a:ext cx="7197726" cy="3668487"/>
+          </a:xfrm>
+        </p:spPr>
+        <p:txBody>
+          <a:bodyPr vert="horz" lIns="91440" tIns="45720" rIns="91440" bIns="45720" rtlCol="0" anchor="b">
+            <a:normAutofit/>
+          </a:bodyPr>
+          <a:lstStyle/>
+          <a:p>
+            <a:pPr algn="r"/>
+            <a:r>
+              <a:rPr lang="en-US" sz="8800" dirty="0"/>
+              <a:t>HVALA NA PAŽNJI</a:t>
+            </a:r>
+          </a:p>
+        </p:txBody>
+      </p:sp>
+    </p:spTree>
+    <p:extLst>
+      <p:ext uri="{BB962C8B-B14F-4D97-AF65-F5344CB8AC3E}">
+        <p14:creationId xmlns:p14="http://schemas.microsoft.com/office/powerpoint/2010/main" val="104998217"/>
+      </p:ext>
+    </p:extLst>
+  </p:cSld>
+  <p:clrMapOvr>
+    <a:masterClrMapping/>
+  </p:clrMapOvr>
+  <mc:AlternateContent xmlns:mc="http://schemas.openxmlformats.org/markup-compatibility/2006" xmlns:p14="http://schemas.microsoft.com/office/powerpoint/2010/main">
+    <mc:Choice Requires="p14">
+      <p:transition spd="slow" p14:dur="800">
+        <p14:flythrough/>
+      </p:transition>
+    </mc:Choice>
+    <mc:Fallback xmlns="">
       <p:transition spd="slow">
         <p:fade/>
       </p:transition>
@@ -6707,7 +6924,7 @@
           <a:p>
             <a:r>
               <a:rPr lang="bs-Latn-BA" sz="3600" dirty="0"/>
-              <a:t>Historija formalnih metoda</a:t>
+              <a:t>Formalne metode su već poznate</a:t>
             </a:r>
           </a:p>
           <a:p>
@@ -6717,9 +6934,17 @@
             </a:r>
           </a:p>
           <a:p>
-            <a:r>
-              <a:rPr lang="bs-Latn-BA" sz="3600" dirty="0"/>
-              <a:t>Razlike između verifikacija</a:t>
+            <a:pPr lvl="1"/>
+            <a:r>
+              <a:rPr lang="bs-Latn-BA" sz="3400" dirty="0"/>
+              <a:t>Statička</a:t>
+            </a:r>
+          </a:p>
+          <a:p>
+            <a:pPr lvl="1"/>
+            <a:r>
+              <a:rPr lang="bs-Latn-BA" sz="3400" dirty="0"/>
+              <a:t>Dinamička</a:t>
             </a:r>
           </a:p>
         </p:txBody>
@@ -6788,13 +7013,13 @@
   <p:clrMapOvr>
     <a:masterClrMapping/>
   </p:clrMapOvr>
-  <mc:AlternateContent xmlns:mc="http://schemas.openxmlformats.org/markup-compatibility/2006">
-    <mc:Choice xmlns:p14="http://schemas.microsoft.com/office/powerpoint/2010/main" Requires="p14">
+  <mc:AlternateContent xmlns:mc="http://schemas.openxmlformats.org/markup-compatibility/2006" xmlns:p14="http://schemas.microsoft.com/office/powerpoint/2010/main">
+    <mc:Choice Requires="p14">
       <p:transition spd="slow" p14:dur="800">
         <p14:flythrough/>
       </p:transition>
     </mc:Choice>
-    <mc:Fallback>
+    <mc:Fallback xmlns="">
       <p:transition spd="slow">
         <p:fade/>
       </p:transition>
@@ -6880,25 +7105,25 @@
           <a:p>
             <a:r>
               <a:rPr lang="bs-Latn-BA" sz="3600" dirty="0"/>
-              <a:t>Opis formalnih metoda</a:t>
+              <a:t>Matematička logika</a:t>
             </a:r>
           </a:p>
           <a:p>
             <a:r>
               <a:rPr lang="bs-Latn-BA" sz="3600" dirty="0"/>
-              <a:t>Klasifikacija</a:t>
+              <a:t>Verifikacija kompletnog sistema </a:t>
             </a:r>
           </a:p>
           <a:p>
             <a:r>
               <a:rPr lang="bs-Latn-BA" sz="3600" dirty="0"/>
-              <a:t>Prednosti</a:t>
+              <a:t>Bolji uvid u zahtjeve </a:t>
             </a:r>
           </a:p>
           <a:p>
             <a:r>
               <a:rPr lang="bs-Latn-BA" sz="3600" dirty="0"/>
-              <a:t>Nedostaci</a:t>
+              <a:t>Za posebno osposobljene inžinjere</a:t>
             </a:r>
           </a:p>
         </p:txBody>
@@ -6927,7 +7152,7 @@
         </p:blipFill>
         <p:spPr>
           <a:xfrm>
-            <a:off x="7799908" y="2773882"/>
+            <a:off x="8488881" y="2457974"/>
             <a:ext cx="3017318" cy="3017318"/>
           </a:xfrm>
           <a:prstGeom prst="rect">
@@ -6952,13 +7177,13 @@
   <p:clrMapOvr>
     <a:masterClrMapping/>
   </p:clrMapOvr>
-  <mc:AlternateContent xmlns:mc="http://schemas.openxmlformats.org/markup-compatibility/2006">
-    <mc:Choice xmlns:p14="http://schemas.microsoft.com/office/powerpoint/2010/main" Requires="p14">
+  <mc:AlternateContent xmlns:mc="http://schemas.openxmlformats.org/markup-compatibility/2006" xmlns:p14="http://schemas.microsoft.com/office/powerpoint/2010/main">
+    <mc:Choice Requires="p14">
       <p:transition spd="slow" p14:dur="800">
         <p14:flythrough/>
       </p:transition>
     </mc:Choice>
-    <mc:Fallback>
+    <mc:Fallback xmlns="">
       <p:transition spd="slow">
         <p:fade/>
       </p:transition>
@@ -7049,7 +7274,7 @@
           <a:p>
             <a:r>
               <a:rPr lang="bs-Latn-BA" sz="3600" dirty="0"/>
-              <a:t>Opis</a:t>
+              <a:t>Ništa drugo do testiranja kôda</a:t>
             </a:r>
           </a:p>
           <a:p>
@@ -7157,13 +7382,13 @@
   <p:clrMapOvr>
     <a:masterClrMapping/>
   </p:clrMapOvr>
-  <mc:AlternateContent xmlns:mc="http://schemas.openxmlformats.org/markup-compatibility/2006">
-    <mc:Choice xmlns:p14="http://schemas.microsoft.com/office/powerpoint/2010/main" Requires="p14">
+  <mc:AlternateContent xmlns:mc="http://schemas.openxmlformats.org/markup-compatibility/2006" xmlns:p14="http://schemas.microsoft.com/office/powerpoint/2010/main">
+    <mc:Choice Requires="p14">
       <p:transition spd="slow" p14:dur="800">
         <p14:flythrough/>
       </p:transition>
     </mc:Choice>
-    <mc:Fallback>
+    <mc:Fallback xmlns="">
       <p:transition spd="slow">
         <p:fade/>
       </p:transition>
@@ -7242,7 +7467,7 @@
         </p:nvSpPr>
         <p:spPr>
           <a:xfrm>
-            <a:off x="1030287" y="1604433"/>
+            <a:off x="312440" y="1604433"/>
             <a:ext cx="10131425" cy="3649133"/>
           </a:xfrm>
         </p:spPr>
@@ -7254,19 +7479,19 @@
           <a:p>
             <a:r>
               <a:rPr lang="bs-Latn-BA" sz="3600" dirty="0"/>
-              <a:t>Način rada</a:t>
+              <a:t>Najjednostavnije testiranje</a:t>
             </a:r>
           </a:p>
           <a:p>
             <a:r>
               <a:rPr lang="bs-Latn-BA" sz="3600" dirty="0"/>
-              <a:t>Prednosti</a:t>
+              <a:t>Čini proces agilnijim</a:t>
             </a:r>
           </a:p>
           <a:p>
             <a:r>
               <a:rPr lang="bs-Latn-BA" sz="3600" dirty="0"/>
-              <a:t>Nedostaci</a:t>
+              <a:t>Dug proces</a:t>
             </a:r>
           </a:p>
         </p:txBody>
@@ -7322,13 +7547,13 @@
   <p:clrMapOvr>
     <a:masterClrMapping/>
   </p:clrMapOvr>
-  <mc:AlternateContent xmlns:mc="http://schemas.openxmlformats.org/markup-compatibility/2006">
-    <mc:Choice xmlns:p14="http://schemas.microsoft.com/office/powerpoint/2010/main" Requires="p14">
+  <mc:AlternateContent xmlns:mc="http://schemas.openxmlformats.org/markup-compatibility/2006" xmlns:p14="http://schemas.microsoft.com/office/powerpoint/2010/main">
+    <mc:Choice Requires="p14">
       <p:transition spd="slow" p14:dur="800">
         <p14:flythrough/>
       </p:transition>
     </mc:Choice>
-    <mc:Fallback>
+    <mc:Fallback xmlns="">
       <p:transition spd="slow">
         <p:fade/>
       </p:transition>
@@ -7475,13 +7700,13 @@
   <p:clrMapOvr>
     <a:masterClrMapping/>
   </p:clrMapOvr>
-  <mc:AlternateContent xmlns:mc="http://schemas.openxmlformats.org/markup-compatibility/2006">
-    <mc:Choice xmlns:p14="http://schemas.microsoft.com/office/powerpoint/2010/main" Requires="p14">
+  <mc:AlternateContent xmlns:mc="http://schemas.openxmlformats.org/markup-compatibility/2006" xmlns:p14="http://schemas.microsoft.com/office/powerpoint/2010/main">
+    <mc:Choice Requires="p14">
       <p:transition spd="slow" p14:dur="800">
         <p14:flythrough/>
       </p:transition>
     </mc:Choice>
-    <mc:Fallback>
+    <mc:Fallback xmlns="">
       <p:transition spd="slow">
         <p:fade/>
       </p:transition>
@@ -7690,13 +7915,13 @@
   <p:clrMapOvr>
     <a:masterClrMapping/>
   </p:clrMapOvr>
-  <mc:AlternateContent xmlns:mc="http://schemas.openxmlformats.org/markup-compatibility/2006">
-    <mc:Choice xmlns:p14="http://schemas.microsoft.com/office/powerpoint/2010/main" Requires="p14">
+  <mc:AlternateContent xmlns:mc="http://schemas.openxmlformats.org/markup-compatibility/2006" xmlns:p14="http://schemas.microsoft.com/office/powerpoint/2010/main">
+    <mc:Choice Requires="p14">
       <p:transition spd="slow" p14:dur="800">
         <p14:flythrough/>
       </p:transition>
     </mc:Choice>
-    <mc:Fallback>
+    <mc:Fallback xmlns="">
       <p:transition spd="slow">
         <p:fade/>
       </p:transition>
@@ -8006,13 +8231,13 @@
   <p:clrMapOvr>
     <a:masterClrMapping/>
   </p:clrMapOvr>
-  <mc:AlternateContent xmlns:mc="http://schemas.openxmlformats.org/markup-compatibility/2006">
-    <mc:Choice xmlns:p14="http://schemas.microsoft.com/office/powerpoint/2010/main" Requires="p14">
+  <mc:AlternateContent xmlns:mc="http://schemas.openxmlformats.org/markup-compatibility/2006" xmlns:p14="http://schemas.microsoft.com/office/powerpoint/2010/main">
+    <mc:Choice Requires="p14">
       <p:transition spd="slow" p14:dur="800">
         <p14:flythrough/>
       </p:transition>
     </mc:Choice>
-    <mc:Fallback>
+    <mc:Fallback xmlns="">
       <p:transition spd="slow">
         <p:fade/>
       </p:transition>
@@ -8089,7 +8314,12 @@
             <p:ph idx="1"/>
           </p:nvPr>
         </p:nvSpPr>
-        <p:spPr/>
+        <p:spPr>
+          <a:xfrm>
+            <a:off x="332137" y="2142065"/>
+            <a:ext cx="10131425" cy="3649133"/>
+          </a:xfrm>
+        </p:spPr>
         <p:txBody>
           <a:bodyPr>
             <a:noAutofit/>
@@ -8098,7 +8328,7 @@
           <a:p>
             <a:r>
               <a:rPr lang="bs-Latn-BA" sz="2800" dirty="0"/>
-              <a:t>Način rada</a:t>
+              <a:t>Spajanje više jedinki u jednu cjelinu</a:t>
             </a:r>
           </a:p>
           <a:p>
@@ -8145,13 +8375,13 @@
           <a:p>
             <a:r>
               <a:rPr lang="bs-Latn-BA" sz="2800" dirty="0"/>
-              <a:t>Prednosti</a:t>
+              <a:t>Različiti moduli rade u jedinstvu</a:t>
             </a:r>
           </a:p>
           <a:p>
             <a:r>
               <a:rPr lang="bs-Latn-BA" sz="2800" dirty="0"/>
-              <a:t>Nedostaci</a:t>
+              <a:t>Teško otkrivanje problematičnog modula</a:t>
             </a:r>
           </a:p>
         </p:txBody>
@@ -8178,39 +8408,23 @@
         </p:blipFill>
         <p:spPr>
           <a:xfrm>
-            <a:off x="6299200" y="1160826"/>
-            <a:ext cx="5803900" cy="5611613"/>
-          </a:xfrm>
-          <a:prstGeom prst="roundRect">
-            <a:avLst>
-              <a:gd name="adj" fmla="val 11111"/>
-            </a:avLst>
+            <a:off x="6794151" y="1160826"/>
+            <a:ext cx="5397849" cy="5611613"/>
+          </a:xfrm>
+          <a:prstGeom prst="rect">
+            <a:avLst/>
           </a:prstGeom>
-          <a:ln w="190500" cap="rnd">
-            <a:solidFill>
-              <a:srgbClr val="002060"/>
-            </a:solidFill>
-            <a:prstDash val="solid"/>
+          <a:ln>
+            <a:noFill/>
           </a:ln>
           <a:effectLst>
-            <a:outerShdw blurRad="101600" dist="50800" dir="7200000" algn="tl" rotWithShape="0">
+            <a:outerShdw blurRad="190500" algn="tl" rotWithShape="0">
               <a:srgbClr val="000000">
-                <a:alpha val="45000"/>
+                <a:alpha val="70000"/>
               </a:srgbClr>
             </a:outerShdw>
+            <a:softEdge rad="241300"/>
           </a:effectLst>
-          <a:scene3d>
-            <a:camera prst="perspectiveFront" fov="5400000"/>
-            <a:lightRig rig="threePt" dir="t">
-              <a:rot lat="0" lon="0" rev="19200000"/>
-            </a:lightRig>
-          </a:scene3d>
-          <a:sp3d extrusionH="25400">
-            <a:bevelT w="304800" h="152400" prst="hardEdge"/>
-            <a:extrusionClr>
-              <a:srgbClr val="FFFFFF"/>
-            </a:extrusionClr>
-          </a:sp3d>
         </p:spPr>
       </p:pic>
     </p:spTree>
@@ -8223,13 +8437,13 @@
   <p:clrMapOvr>
     <a:masterClrMapping/>
   </p:clrMapOvr>
-  <mc:AlternateContent xmlns:mc="http://schemas.openxmlformats.org/markup-compatibility/2006">
-    <mc:Choice xmlns:p14="http://schemas.microsoft.com/office/powerpoint/2010/main" Requires="p14">
+  <mc:AlternateContent xmlns:mc="http://schemas.openxmlformats.org/markup-compatibility/2006" xmlns:p14="http://schemas.microsoft.com/office/powerpoint/2010/main">
+    <mc:Choice Requires="p14">
       <p:transition spd="slow" p14:dur="800">
         <p14:flythrough/>
       </p:transition>
     </mc:Choice>
-    <mc:Fallback>
+    <mc:Fallback xmlns="">
       <p:transition spd="slow">
         <p:fade/>
       </p:transition>

</xml_diff>